<commit_message>
Update chapter 3 slide
</commit_message>
<xml_diff>
--- a/slides/03 - Chapter 3 - Functions.pptx
+++ b/slides/03 - Chapter 3 - Functions.pptx
@@ -5,7 +5,7 @@
     <p:sldMasterId id="2147483648" r:id="rId1"/>
   </p:sldMasterIdLst>
   <p:notesMasterIdLst>
-    <p:notesMasterId r:id="rId30"/>
+    <p:notesMasterId r:id="rId31"/>
   </p:notesMasterIdLst>
   <p:sldIdLst>
     <p:sldId id="271" r:id="rId2"/>
@@ -35,7 +35,8 @@
     <p:sldId id="291" r:id="rId26"/>
     <p:sldId id="274" r:id="rId27"/>
     <p:sldId id="293" r:id="rId28"/>
-    <p:sldId id="270" r:id="rId29"/>
+    <p:sldId id="301" r:id="rId29"/>
+    <p:sldId id="270" r:id="rId30"/>
   </p:sldIdLst>
   <p:sldSz cx="12192000" cy="6858000"/>
   <p:notesSz cx="12192000" cy="6858000"/>
@@ -3039,6 +3040,101 @@
     <p:extLst>
       <p:ext uri="{BB962C8B-B14F-4D97-AF65-F5344CB8AC3E}">
         <p14:creationId xmlns:p14="http://schemas.microsoft.com/office/powerpoint/2010/main" val="441151344"/>
+      </p:ext>
+    </p:extLst>
+  </p:cSld>
+  <p:clrMapOvr>
+    <a:masterClrMapping/>
+  </p:clrMapOvr>
+</p:notes>
+</file>
+
+<file path=ppt/notesSlides/notesSlide27.xml><?xml version="1.0" encoding="utf-8"?>
+<p:notes xmlns:a="http://schemas.openxmlformats.org/drawingml/2006/main" xmlns:r="http://schemas.openxmlformats.org/officeDocument/2006/relationships" xmlns:p="http://schemas.openxmlformats.org/presentationml/2006/main">
+  <p:cSld>
+    <p:spTree>
+      <p:nvGrpSpPr>
+        <p:cNvPr id="1" name=""/>
+        <p:cNvGrpSpPr/>
+        <p:nvPr/>
+      </p:nvGrpSpPr>
+      <p:grpSpPr>
+        <a:xfrm>
+          <a:off x="0" y="0"/>
+          <a:ext cx="0" cy="0"/>
+          <a:chOff x="0" y="0"/>
+          <a:chExt cx="0" cy="0"/>
+        </a:xfrm>
+      </p:grpSpPr>
+      <p:sp>
+        <p:nvSpPr>
+          <p:cNvPr id="2" name="Slide Image Placeholder 1"/>
+          <p:cNvSpPr>
+            <a:spLocks noGrp="1" noRot="1" noChangeAspect="1"/>
+          </p:cNvSpPr>
+          <p:nvPr>
+            <p:ph type="sldImg"/>
+          </p:nvPr>
+        </p:nvSpPr>
+        <p:spPr/>
+      </p:sp>
+      <p:sp>
+        <p:nvSpPr>
+          <p:cNvPr id="3" name="Notes Placeholder 2"/>
+          <p:cNvSpPr>
+            <a:spLocks noGrp="1"/>
+          </p:cNvSpPr>
+          <p:nvPr>
+            <p:ph type="body" idx="1"/>
+          </p:nvPr>
+        </p:nvSpPr>
+        <p:spPr/>
+        <p:txBody>
+          <a:bodyPr/>
+          <a:lstStyle/>
+          <a:p>
+            <a:pPr marL="0" indent="0" rtl="0" fontAlgn="ctr">
+              <a:buNone/>
+            </a:pPr>
+            <a:endParaRPr lang="x-none" sz="1200" kern="1200" dirty="0" smtClean="0">
+              <a:solidFill>
+                <a:schemeClr val="tx1"/>
+              </a:solidFill>
+              <a:effectLst/>
+              <a:latin typeface="+mn-lt"/>
+              <a:ea typeface="+mn-ea"/>
+              <a:cs typeface="+mn-cs"/>
+            </a:endParaRPr>
+          </a:p>
+        </p:txBody>
+      </p:sp>
+      <p:sp>
+        <p:nvSpPr>
+          <p:cNvPr id="4" name="Slide Number Placeholder 3"/>
+          <p:cNvSpPr>
+            <a:spLocks noGrp="1"/>
+          </p:cNvSpPr>
+          <p:nvPr>
+            <p:ph type="sldNum" sz="quarter" idx="10"/>
+          </p:nvPr>
+        </p:nvSpPr>
+        <p:spPr/>
+        <p:txBody>
+          <a:bodyPr/>
+          <a:lstStyle/>
+          <a:p>
+            <a:fld id="{38627BB8-F6A4-4A78-9DDC-C4121304CC62}" type="slidenum">
+              <a:rPr lang="en-US" smtClean="0"/>
+              <a:t>28</a:t>
+            </a:fld>
+            <a:endParaRPr lang="en-US"/>
+          </a:p>
+        </p:txBody>
+      </p:sp>
+    </p:spTree>
+    <p:extLst>
+      <p:ext uri="{BB962C8B-B14F-4D97-AF65-F5344CB8AC3E}">
+        <p14:creationId xmlns:p14="http://schemas.microsoft.com/office/powerpoint/2010/main" val="3778549639"/>
       </p:ext>
     </p:extLst>
   </p:cSld>
@@ -9462,6 +9558,369 @@
 </file>
 
 <file path=ppt/slides/slide28.xml><?xml version="1.0" encoding="utf-8"?>
+<p:sld xmlns:a="http://schemas.openxmlformats.org/drawingml/2006/main" xmlns:r="http://schemas.openxmlformats.org/officeDocument/2006/relationships" xmlns:p="http://schemas.openxmlformats.org/presentationml/2006/main">
+  <p:cSld>
+    <p:spTree>
+      <p:nvGrpSpPr>
+        <p:cNvPr id="1" name=""/>
+        <p:cNvGrpSpPr/>
+        <p:nvPr/>
+      </p:nvGrpSpPr>
+      <p:grpSpPr>
+        <a:xfrm>
+          <a:off x="0" y="0"/>
+          <a:ext cx="0" cy="0"/>
+          <a:chOff x="0" y="0"/>
+          <a:chExt cx="0" cy="0"/>
+        </a:xfrm>
+      </p:grpSpPr>
+      <p:sp>
+        <p:nvSpPr>
+          <p:cNvPr id="2" name="object 2"/>
+          <p:cNvSpPr txBox="1">
+            <a:spLocks noGrp="1"/>
+          </p:cNvSpPr>
+          <p:nvPr>
+            <p:ph type="title"/>
+          </p:nvPr>
+        </p:nvSpPr>
+        <p:spPr>
+          <a:xfrm>
+            <a:off x="-838200" y="1143476"/>
+            <a:ext cx="12265405" cy="615553"/>
+          </a:xfrm>
+          <a:prstGeom prst="rect">
+            <a:avLst/>
+          </a:prstGeom>
+        </p:spPr>
+        <p:txBody>
+          <a:bodyPr vert="horz" wrap="square" lIns="0" tIns="0" rIns="0" bIns="0" rtlCol="0">
+            <a:spAutoFit/>
+          </a:bodyPr>
+          <a:lstStyle/>
+          <a:p>
+            <a:pPr marL="6086475">
+              <a:lnSpc>
+                <a:spcPct val="100000"/>
+              </a:lnSpc>
+            </a:pPr>
+            <a:r>
+              <a:rPr lang="en-US" spc="-5" dirty="0" smtClean="0">
+                <a:solidFill>
+                  <a:srgbClr val="00B0F0"/>
+                </a:solidFill>
+              </a:rPr>
+              <a:t>Practice</a:t>
+            </a:r>
+            <a:r>
+              <a:rPr lang="en-US" spc="-5" dirty="0" smtClean="0"/>
+              <a:t>: Checklist for PR</a:t>
+            </a:r>
+            <a:endParaRPr spc="-5" dirty="0">
+              <a:latin typeface="Century Gothic"/>
+              <a:cs typeface="Century Gothic"/>
+            </a:endParaRPr>
+          </a:p>
+        </p:txBody>
+      </p:sp>
+      <p:sp>
+        <p:nvSpPr>
+          <p:cNvPr id="3" name="object 3"/>
+          <p:cNvSpPr txBox="1"/>
+          <p:nvPr/>
+        </p:nvSpPr>
+        <p:spPr>
+          <a:xfrm>
+            <a:off x="892986" y="2286000"/>
+            <a:ext cx="10534219" cy="3447098"/>
+          </a:xfrm>
+          <a:prstGeom prst="rect">
+            <a:avLst/>
+          </a:prstGeom>
+        </p:spPr>
+        <p:txBody>
+          <a:bodyPr vert="horz" wrap="square" lIns="0" tIns="0" rIns="0" bIns="0" rtlCol="0">
+            <a:spAutoFit/>
+          </a:bodyPr>
+          <a:lstStyle/>
+          <a:p>
+            <a:pPr marL="12700">
+              <a:lnSpc>
+                <a:spcPct val="100000"/>
+              </a:lnSpc>
+              <a:tabLst>
+                <a:tab pos="241300" algn="l"/>
+              </a:tabLst>
+            </a:pPr>
+            <a:r>
+              <a:rPr lang="en-US" sz="3200" dirty="0" smtClean="0">
+                <a:solidFill>
+                  <a:srgbClr val="FFFFFF"/>
+                </a:solidFill>
+                <a:latin typeface="Century Gothic"/>
+                <a:cs typeface="Century Gothic"/>
+              </a:rPr>
+              <a:t>Code of conduct:</a:t>
+            </a:r>
+          </a:p>
+          <a:p>
+            <a:pPr marL="469900" indent="-457200">
+              <a:lnSpc>
+                <a:spcPct val="100000"/>
+              </a:lnSpc>
+              <a:buFontTx/>
+              <a:buChar char="-"/>
+              <a:tabLst>
+                <a:tab pos="241300" algn="l"/>
+              </a:tabLst>
+            </a:pPr>
+            <a:r>
+              <a:rPr lang="en-US" sz="3200" dirty="0" smtClean="0">
+                <a:solidFill>
+                  <a:srgbClr val="FFFFFF"/>
+                </a:solidFill>
+                <a:latin typeface="Century Gothic"/>
+                <a:cs typeface="Century Gothic"/>
+              </a:rPr>
+              <a:t>Clone project into your local machine</a:t>
+            </a:r>
+          </a:p>
+          <a:p>
+            <a:pPr marL="469900" indent="-457200">
+              <a:lnSpc>
+                <a:spcPct val="100000"/>
+              </a:lnSpc>
+              <a:buFontTx/>
+              <a:buChar char="-"/>
+              <a:tabLst>
+                <a:tab pos="241300" algn="l"/>
+              </a:tabLst>
+            </a:pPr>
+            <a:r>
+              <a:rPr lang="en-US" sz="3200" dirty="0" smtClean="0">
+                <a:solidFill>
+                  <a:srgbClr val="FFFFFF"/>
+                </a:solidFill>
+                <a:latin typeface="Century Gothic"/>
+                <a:cs typeface="Century Gothic"/>
+              </a:rPr>
+              <a:t>Create a branch with name </a:t>
+            </a:r>
+            <a:r>
+              <a:rPr lang="en-US" sz="3200" dirty="0" smtClean="0">
+                <a:solidFill>
+                  <a:srgbClr val="00B0F0"/>
+                </a:solidFill>
+                <a:latin typeface="Century Gothic"/>
+                <a:cs typeface="Century Gothic"/>
+              </a:rPr>
+              <a:t>cr12_{</a:t>
+            </a:r>
+            <a:r>
+              <a:rPr lang="en-US" sz="3200" dirty="0" err="1" smtClean="0">
+                <a:solidFill>
+                  <a:srgbClr val="00B0F0"/>
+                </a:solidFill>
+                <a:latin typeface="Century Gothic"/>
+                <a:cs typeface="Century Gothic"/>
+              </a:rPr>
+              <a:t>your_name</a:t>
+            </a:r>
+            <a:r>
+              <a:rPr lang="en-US" sz="3200" dirty="0" smtClean="0">
+                <a:solidFill>
+                  <a:srgbClr val="00B0F0"/>
+                </a:solidFill>
+                <a:latin typeface="Century Gothic"/>
+                <a:cs typeface="Century Gothic"/>
+              </a:rPr>
+              <a:t>}</a:t>
+            </a:r>
+          </a:p>
+          <a:p>
+            <a:pPr marL="469900" indent="-457200">
+              <a:lnSpc>
+                <a:spcPct val="100000"/>
+              </a:lnSpc>
+              <a:buFontTx/>
+              <a:buChar char="-"/>
+              <a:tabLst>
+                <a:tab pos="241300" algn="l"/>
+              </a:tabLst>
+            </a:pPr>
+            <a:r>
+              <a:rPr lang="en-US" sz="3200" dirty="0" smtClean="0">
+                <a:solidFill>
+                  <a:srgbClr val="FFFFFF"/>
+                </a:solidFill>
+                <a:latin typeface="Century Gothic"/>
+                <a:cs typeface="Century Gothic"/>
+              </a:rPr>
+              <a:t>Write </a:t>
+            </a:r>
+            <a:r>
+              <a:rPr lang="en-US" sz="3200" dirty="0">
+                <a:solidFill>
+                  <a:srgbClr val="FFFFFF"/>
+                </a:solidFill>
+                <a:latin typeface="Century Gothic"/>
+                <a:cs typeface="Century Gothic"/>
+              </a:rPr>
+              <a:t>down your task to </a:t>
+            </a:r>
+            <a:r>
+              <a:rPr lang="en-US" sz="3200" dirty="0">
+                <a:solidFill>
+                  <a:srgbClr val="FFFF00"/>
+                </a:solidFill>
+                <a:latin typeface="Century Gothic"/>
+                <a:cs typeface="Century Gothic"/>
+              </a:rPr>
+              <a:t>Code Review </a:t>
+            </a:r>
+            <a:r>
+              <a:rPr lang="en-US" sz="3200" dirty="0" smtClean="0">
+                <a:solidFill>
+                  <a:srgbClr val="FFFF00"/>
+                </a:solidFill>
+                <a:latin typeface="Century Gothic"/>
+                <a:cs typeface="Century Gothic"/>
+              </a:rPr>
+              <a:t>checklist.md</a:t>
+            </a:r>
+          </a:p>
+          <a:p>
+            <a:pPr marL="469900" indent="-457200">
+              <a:lnSpc>
+                <a:spcPct val="100000"/>
+              </a:lnSpc>
+              <a:buFontTx/>
+              <a:buChar char="-"/>
+              <a:tabLst>
+                <a:tab pos="241300" algn="l"/>
+              </a:tabLst>
+            </a:pPr>
+            <a:r>
+              <a:rPr lang="en-US" sz="3200" dirty="0" smtClean="0">
+                <a:solidFill>
+                  <a:srgbClr val="FFFFFF"/>
+                </a:solidFill>
+                <a:latin typeface="Century Gothic"/>
+                <a:cs typeface="Century Gothic"/>
+              </a:rPr>
+              <a:t>Push your changes to remote</a:t>
+            </a:r>
+          </a:p>
+          <a:p>
+            <a:pPr marL="469900" indent="-457200">
+              <a:lnSpc>
+                <a:spcPct val="100000"/>
+              </a:lnSpc>
+              <a:buFontTx/>
+              <a:buChar char="-"/>
+              <a:tabLst>
+                <a:tab pos="241300" algn="l"/>
+              </a:tabLst>
+            </a:pPr>
+            <a:endParaRPr lang="en-US" sz="3200" dirty="0">
+              <a:solidFill>
+                <a:srgbClr val="FFFFFF"/>
+              </a:solidFill>
+              <a:latin typeface="Century Gothic"/>
+              <a:cs typeface="Century Gothic"/>
+            </a:endParaRPr>
+          </a:p>
+          <a:p>
+            <a:pPr marL="469900" indent="-457200">
+              <a:lnSpc>
+                <a:spcPct val="100000"/>
+              </a:lnSpc>
+              <a:buFontTx/>
+              <a:buChar char="-"/>
+              <a:tabLst>
+                <a:tab pos="241300" algn="l"/>
+              </a:tabLst>
+            </a:pPr>
+            <a:r>
+              <a:rPr lang="en-US" sz="3200" dirty="0" smtClean="0">
+                <a:solidFill>
+                  <a:srgbClr val="FFFFFF"/>
+                </a:solidFill>
+                <a:latin typeface="Century Gothic"/>
+                <a:cs typeface="Century Gothic"/>
+              </a:rPr>
+              <a:t>Use English only</a:t>
+            </a:r>
+            <a:endParaRPr lang="en-US" sz="3200" dirty="0" smtClean="0">
+              <a:solidFill>
+                <a:srgbClr val="FFFF00"/>
+              </a:solidFill>
+              <a:latin typeface="Century Gothic"/>
+              <a:cs typeface="Century Gothic"/>
+            </a:endParaRPr>
+          </a:p>
+        </p:txBody>
+      </p:sp>
+      <p:sp>
+        <p:nvSpPr>
+          <p:cNvPr id="4" name="TextBox 3"/>
+          <p:cNvSpPr txBox="1"/>
+          <p:nvPr/>
+        </p:nvSpPr>
+        <p:spPr>
+          <a:xfrm>
+            <a:off x="3718240" y="6023349"/>
+            <a:ext cx="4883709" cy="400110"/>
+          </a:xfrm>
+          <a:prstGeom prst="rect">
+            <a:avLst/>
+          </a:prstGeom>
+          <a:noFill/>
+        </p:spPr>
+        <p:txBody>
+          <a:bodyPr wrap="none" rtlCol="0">
+            <a:spAutoFit/>
+          </a:bodyPr>
+          <a:lstStyle/>
+          <a:p>
+            <a:r>
+              <a:rPr lang="en-US" sz="2000" dirty="0">
+                <a:solidFill>
+                  <a:schemeClr val="bg1"/>
+                </a:solidFill>
+                <a:hlinkClick r:id="rId3"/>
+              </a:rPr>
+              <a:t>https://github.com/javaherisaber/CleanCode</a:t>
+            </a:r>
+            <a:endParaRPr lang="en-US" sz="2000" dirty="0">
+              <a:solidFill>
+                <a:schemeClr val="bg1"/>
+              </a:solidFill>
+            </a:endParaRPr>
+          </a:p>
+        </p:txBody>
+      </p:sp>
+    </p:spTree>
+    <p:extLst>
+      <p:ext uri="{BB962C8B-B14F-4D97-AF65-F5344CB8AC3E}">
+        <p14:creationId xmlns:p14="http://schemas.microsoft.com/office/powerpoint/2010/main" val="312971025"/>
+      </p:ext>
+    </p:extLst>
+  </p:cSld>
+  <p:clrMapOvr>
+    <a:masterClrMapping/>
+  </p:clrMapOvr>
+  <p:timing>
+    <p:tnLst>
+      <p:par>
+        <p:cTn id="1" dur="indefinite" restart="never" nodeType="tmRoot"/>
+      </p:par>
+    </p:tnLst>
+  </p:timing>
+</p:sld>
+</file>
+
+<file path=ppt/slides/slide29.xml><?xml version="1.0" encoding="utf-8"?>
 <p:sld xmlns:a="http://schemas.openxmlformats.org/drawingml/2006/main" xmlns:r="http://schemas.openxmlformats.org/officeDocument/2006/relationships" xmlns:p="http://schemas.openxmlformats.org/presentationml/2006/main">
   <p:cSld>
     <p:spTree>

</xml_diff>